<commit_message>
Corrected Part2 html and link in pptx
</commit_message>
<xml_diff>
--- a/qmmm1.pptx
+++ b/qmmm1.pptx
@@ -674,20 +674,6 @@
           <a:bodyPr/>
           <a:lstStyle/>
           <a:p>
-            <a:r>
-              <a:rPr lang="en-US" dirty="0" smtClean="0"/>
-              <a:t>Thanks for chance to speak - Nice</a:t>
-            </a:r>
-            <a:r>
-              <a:rPr lang="en-US" baseline="0" dirty="0" smtClean="0"/>
-              <a:t> to be a speaker, not an organizer.</a:t>
-            </a:r>
-          </a:p>
-          <a:p>
-            <a:r>
-              <a:rPr lang="en-US" baseline="0" dirty="0" smtClean="0"/>
-              <a:t>Today, I’ll will briefly discuss three different recent projects, united around the theme of conformational change and catalysis in enzymes.</a:t>
-            </a:r>
             <a:endParaRPr lang="en-US" dirty="0"/>
           </a:p>
         </p:txBody>
@@ -4430,7 +4416,23 @@
             </a:r>
             <a:r>
               <a:rPr lang="en-GB" sz="1800" dirty="0" smtClean="0"/>
-              <a:t>Bristol, 11 Nov 2014</a:t>
+              <a:t>Bristol, </a:t>
+            </a:r>
+            <a:r>
+              <a:rPr lang="en-GB" sz="1800" dirty="0"/>
+              <a:t>9</a:t>
+            </a:r>
+            <a:r>
+              <a:rPr lang="en-GB" sz="1800" dirty="0" smtClean="0"/>
+              <a:t> </a:t>
+            </a:r>
+            <a:r>
+              <a:rPr lang="en-GB" sz="1800" dirty="0" smtClean="0"/>
+              <a:t>Nov </a:t>
+            </a:r>
+            <a:r>
+              <a:rPr lang="en-GB" sz="1800" dirty="0" smtClean="0"/>
+              <a:t>2017</a:t>
             </a:r>
             <a:endParaRPr lang="en-GB" sz="1800" dirty="0"/>
           </a:p>
@@ -4920,51 +4922,14 @@
               <a:t>Instructions: </a:t>
             </a:r>
             <a:r>
-              <a:rPr lang="en-GB" sz="2200" kern="0" dirty="0" err="1" smtClean="0">
+              <a:rPr lang="en-GB" sz="1900" kern="0" dirty="0">
                 <a:solidFill>
                   <a:srgbClr val="3333FF"/>
                 </a:solidFill>
-                <a:latin typeface="+mj-lt"/>
               </a:rPr>
-              <a:t>www.chm.bris.ac.uk</a:t>
-            </a:r>
-            <a:r>
-              <a:rPr lang="en-GB" sz="2200" kern="0" dirty="0" smtClean="0">
-                <a:solidFill>
-                  <a:srgbClr val="3333FF"/>
-                </a:solidFill>
-                <a:latin typeface="+mj-lt"/>
-              </a:rPr>
-              <a:t>/~</a:t>
-            </a:r>
-            <a:r>
-              <a:rPr lang="en-GB" sz="2200" kern="0" dirty="0" err="1" smtClean="0">
-                <a:solidFill>
-                  <a:srgbClr val="3333FF"/>
-                </a:solidFill>
-                <a:latin typeface="+mj-lt"/>
-              </a:rPr>
-              <a:t>chmwvdk</a:t>
-            </a:r>
-            <a:r>
-              <a:rPr lang="en-GB" sz="2200" kern="0" dirty="0" smtClean="0">
-                <a:solidFill>
-                  <a:srgbClr val="3333FF"/>
-                </a:solidFill>
-                <a:latin typeface="+mj-lt"/>
-              </a:rPr>
-              <a:t>/</a:t>
-            </a:r>
-            <a:r>
-              <a:rPr lang="en-GB" sz="2200" kern="0" dirty="0" err="1" smtClean="0">
-                <a:solidFill>
-                  <a:srgbClr val="3333FF"/>
-                </a:solidFill>
-                <a:latin typeface="+mj-lt"/>
-              </a:rPr>
-              <a:t>qmmm_practical</a:t>
-            </a:r>
-            <a:endParaRPr lang="en-GB" sz="2200" kern="0" dirty="0" smtClean="0">
+              <a:t>https://github.com/marcvanderkamp/qmmm_practical_short/</a:t>
+            </a:r>
+            <a:endParaRPr lang="en-GB" sz="1900" kern="0" dirty="0" smtClean="0">
               <a:solidFill>
                 <a:srgbClr val="3333FF"/>
               </a:solidFill>
@@ -4983,6 +4948,9 @@
               </a:rPr>
               <a:t>To force the reaction, we will use a ‘reaction coordinate’: difference in distances of the bond formed and the bond broken</a:t>
             </a:r>
+            <a:endParaRPr lang="en-GB" sz="2200" kern="0" dirty="0" smtClean="0">
+              <a:latin typeface="+mj-lt"/>
+            </a:endParaRPr>
           </a:p>
         </p:txBody>
       </p:sp>
@@ -5858,31 +5826,13 @@
               <a:t>Instructions: </a:t>
             </a:r>
             <a:r>
-              <a:rPr lang="en-GB" sz="2200" kern="0" dirty="0" err="1" smtClean="0">
+              <a:rPr lang="en-GB" sz="2200" kern="0" dirty="0">
                 <a:solidFill>
                   <a:srgbClr val="3333FF"/>
                 </a:solidFill>
                 <a:latin typeface="+mj-lt"/>
               </a:rPr>
-              <a:t>www.chm.bris.ac.uk</a:t>
-            </a:r>
-            <a:r>
-              <a:rPr lang="en-GB" sz="2200" kern="0" dirty="0" smtClean="0">
-                <a:solidFill>
-                  <a:srgbClr val="3333FF"/>
-                </a:solidFill>
-                <a:latin typeface="+mj-lt"/>
-              </a:rPr>
-              <a:t>/~</a:t>
-            </a:r>
-            <a:r>
-              <a:rPr lang="en-GB" sz="2200" kern="0" dirty="0" err="1" smtClean="0">
-                <a:solidFill>
-                  <a:srgbClr val="3333FF"/>
-                </a:solidFill>
-                <a:latin typeface="+mj-lt"/>
-              </a:rPr>
-              <a:t>chmwvdk</a:t>
+              <a:t>https://github.com/marcvanderkamp/qmmm_practical_short</a:t>
             </a:r>
             <a:r>
               <a:rPr lang="en-GB" sz="2200" kern="0" dirty="0" smtClean="0">
@@ -5893,19 +5843,7 @@
               </a:rPr>
               <a:t>/</a:t>
             </a:r>
-            <a:r>
-              <a:rPr lang="en-GB" sz="2200" kern="0" dirty="0" err="1" smtClean="0">
-                <a:solidFill>
-                  <a:srgbClr val="3333FF"/>
-                </a:solidFill>
-                <a:latin typeface="+mj-lt"/>
-              </a:rPr>
-              <a:t>qmmm_practical</a:t>
-            </a:r>
             <a:endParaRPr lang="en-GB" sz="2200" kern="0" dirty="0" smtClean="0">
-              <a:solidFill>
-                <a:srgbClr val="3333FF"/>
-              </a:solidFill>
               <a:latin typeface="+mj-lt"/>
             </a:endParaRPr>
           </a:p>
@@ -5919,8 +5857,11 @@
               <a:rPr lang="en-GB" sz="2200" kern="0" dirty="0" smtClean="0">
                 <a:latin typeface="+mj-lt"/>
               </a:rPr>
-              <a:t>Go directly to Part 1, procedure</a:t>
-            </a:r>
+              <a:t>Scroll down and click the link indicated</a:t>
+            </a:r>
+            <a:endParaRPr lang="en-GB" sz="2200" kern="0" dirty="0" smtClean="0">
+              <a:latin typeface="+mj-lt"/>
+            </a:endParaRPr>
           </a:p>
           <a:p>
             <a:pPr>
@@ -5929,49 +5870,33 @@
               </a:lnSpc>
             </a:pPr>
             <a:r>
-              <a:rPr lang="en-GB" sz="2200" kern="0" dirty="0"/>
-              <a:t>Download of zip file (</a:t>
-            </a:r>
-            <a:r>
-              <a:rPr lang="en-GB" sz="2200" kern="0" dirty="0" err="1"/>
-              <a:t>qmmm.zip</a:t>
-            </a:r>
-            <a:r>
-              <a:rPr lang="en-GB" sz="2200" kern="0" dirty="0"/>
-              <a:t>) requires login:</a:t>
-            </a:r>
-          </a:p>
-          <a:p>
-            <a:pPr marL="457200" lvl="1" indent="0">
+              <a:rPr lang="en-GB" sz="2200" kern="0" dirty="0" smtClean="0">
+                <a:latin typeface="+mj-lt"/>
+              </a:rPr>
+              <a:t>Go directly to Part 1, procedure</a:t>
+            </a:r>
+          </a:p>
+          <a:p>
+            <a:pPr>
               <a:lnSpc>
                 <a:spcPct val="90000"/>
               </a:lnSpc>
-              <a:buNone/>
             </a:pPr>
             <a:r>
               <a:rPr lang="en-GB" sz="2200" kern="0" dirty="0"/>
-              <a:t>Username: </a:t>
-            </a:r>
-            <a:r>
-              <a:rPr lang="en-GB" sz="2200" b="1" kern="0" dirty="0" err="1"/>
-              <a:t>qmmm</a:t>
-            </a:r>
-            <a:endParaRPr lang="en-GB" sz="2200" b="1" kern="0" dirty="0"/>
-          </a:p>
-          <a:p>
-            <a:pPr marL="457200" lvl="1" indent="0">
-              <a:lnSpc>
-                <a:spcPct val="90000"/>
-              </a:lnSpc>
-              <a:buNone/>
-            </a:pPr>
-            <a:r>
-              <a:rPr lang="en-GB" sz="2200" kern="0" dirty="0"/>
-              <a:t>Password: </a:t>
-            </a:r>
-            <a:r>
-              <a:rPr lang="en-GB" sz="2200" b="1" kern="0" dirty="0" err="1"/>
-              <a:t>chorismate</a:t>
+              <a:t>Download of zip file (qmmm.zip</a:t>
+            </a:r>
+            <a:r>
+              <a:rPr lang="en-GB" sz="2200" kern="0" dirty="0" smtClean="0"/>
+              <a:t>) to:   </a:t>
+            </a:r>
+            <a:r>
+              <a:rPr lang="en-GB" sz="2200" b="1" kern="0" dirty="0" err="1" smtClean="0"/>
+              <a:t>MyFiles</a:t>
+            </a:r>
+            <a:r>
+              <a:rPr lang="en-GB" sz="2200" b="1" kern="0" dirty="0" smtClean="0"/>
+              <a:t> (O:)</a:t>
             </a:r>
             <a:endParaRPr lang="en-GB" sz="2200" b="1" kern="0" dirty="0"/>
           </a:p>
@@ -6678,7 +6603,7 @@
           <a:graphicData uri="http://schemas.openxmlformats.org/presentationml/2006/ole">
             <mc:AlternateContent xmlns:mc="http://schemas.openxmlformats.org/markup-compatibility/2006">
               <mc:Choice xmlns:v="urn:schemas-microsoft-com:vml" Requires="v">
-                <p:oleObj spid="_x0000_s4112" name="Picture" r:id="rId4" imgW="7561080" imgH="3616200" progId="Word.Picture.8">
+                <p:oleObj spid="_x0000_s4115" name="Picture" r:id="rId4" imgW="7561080" imgH="3616200" progId="Word.Picture.8">
                   <p:embed/>
                 </p:oleObj>
               </mc:Choice>
@@ -6815,7 +6740,7 @@
           <a:noFill/>
           <a:extLst>
             <a:ext uri="{909E8E84-426E-40dd-AFC4-6F175D3DCCD1}">
-              <a14:hiddenFill xmlns:a14="http://schemas.microsoft.com/office/drawing/2010/main" xmlns="">
+              <a14:hiddenFill xmlns="" xmlns:a14="http://schemas.microsoft.com/office/drawing/2010/main">
                 <a:solidFill>
                   <a:srgbClr val="FFFFFF"/>
                 </a:solidFill>
@@ -8082,7 +8007,7 @@
           <a:noFill/>
           <a:extLst>
             <a:ext uri="{909E8E84-426E-40dd-AFC4-6F175D3DCCD1}">
-              <a14:hiddenFill xmlns:a14="http://schemas.microsoft.com/office/drawing/2010/main" xmlns="">
+              <a14:hiddenFill xmlns="" xmlns:a14="http://schemas.microsoft.com/office/drawing/2010/main">
                 <a:solidFill>
                   <a:srgbClr val="FFFFFF"/>
                 </a:solidFill>

</xml_diff>

<commit_message>
Updates to qmmm.zip etc.
</commit_message>
<xml_diff>
--- a/qmmm1.pptx
+++ b/qmmm1.pptx
@@ -5,7 +5,7 @@
     <p:sldMasterId id="2147483649" r:id="rId1"/>
   </p:sldMasterIdLst>
   <p:notesMasterIdLst>
-    <p:notesMasterId r:id="rId13"/>
+    <p:notesMasterId r:id="rId14"/>
   </p:notesMasterIdLst>
   <p:sldIdLst>
     <p:sldId id="257" r:id="rId2"/>
@@ -19,6 +19,7 @@
     <p:sldId id="336" r:id="rId10"/>
     <p:sldId id="337" r:id="rId11"/>
     <p:sldId id="338" r:id="rId12"/>
+    <p:sldId id="339" r:id="rId13"/>
   </p:sldIdLst>
   <p:sldSz cx="9144000" cy="6858000" type="screen4x3"/>
   <p:notesSz cx="6858000" cy="9144000"/>
@@ -4385,7 +4386,7 @@
         </p:nvSpPr>
         <p:spPr>
           <a:xfrm>
-            <a:off x="2022438" y="4347373"/>
+            <a:off x="2041847" y="4857736"/>
             <a:ext cx="5054638" cy="658812"/>
           </a:xfrm>
         </p:spPr>
@@ -4424,15 +4425,7 @@
             </a:r>
             <a:r>
               <a:rPr lang="en-GB" sz="1800" dirty="0" smtClean="0"/>
-              <a:t> </a:t>
-            </a:r>
-            <a:r>
-              <a:rPr lang="en-GB" sz="1800" dirty="0" smtClean="0"/>
-              <a:t>Nov </a:t>
-            </a:r>
-            <a:r>
-              <a:rPr lang="en-GB" sz="1800" dirty="0" smtClean="0"/>
-              <a:t>2017</a:t>
+              <a:t> Nov 2017</a:t>
             </a:r>
             <a:endParaRPr lang="en-GB" sz="1800" dirty="0"/>
           </a:p>
@@ -4440,7 +4433,7 @@
       </p:sp>
       <p:sp>
         <p:nvSpPr>
-          <p:cNvPr id="5" name="Rectangle 3"/>
+          <p:cNvPr id="6" name="Rectangle 3"/>
           <p:cNvSpPr txBox="1">
             <a:spLocks noChangeArrowheads="1"/>
           </p:cNvSpPr>
@@ -4448,7 +4441,7 @@
         </p:nvSpPr>
         <p:spPr bwMode="auto">
           <a:xfrm>
-            <a:off x="214606" y="3512663"/>
+            <a:off x="171325" y="3532672"/>
             <a:ext cx="8709120" cy="392587"/>
           </a:xfrm>
           <a:prstGeom prst="rect">
@@ -4481,12 +4474,53 @@
               <a:defRPr/>
             </a:pPr>
             <a:r>
-              <a:rPr lang="en-GB" sz="2200" i="1" kern="0" dirty="0" smtClean="0">
+              <a:rPr lang="en-GB" sz="2000" i="1" kern="0" dirty="0" smtClean="0">
                 <a:latin typeface="+mn-lt"/>
               </a:rPr>
               <a:t>Marc W. van der Kamp</a:t>
             </a:r>
-            <a:endParaRPr kumimoji="0" lang="en-GB" sz="2200" b="0" i="1" strike="noStrike" kern="0" cap="none" spc="0" normalizeH="0" baseline="0" noProof="0" dirty="0" smtClean="0">
+          </a:p>
+          <a:p>
+            <a:pPr lvl="0" algn="ctr">
+              <a:spcBef>
+                <a:spcPct val="20000"/>
+              </a:spcBef>
+              <a:buClr>
+                <a:srgbClr val="2858BB"/>
+              </a:buClr>
+              <a:defRPr/>
+            </a:pPr>
+            <a:r>
+              <a:rPr kumimoji="0" lang="en-GB" sz="2000" b="0" i="1" strike="noStrike" kern="0" cap="none" spc="0" normalizeH="0" baseline="0" noProof="0" dirty="0" smtClean="0">
+                <a:ln>
+                  <a:noFill/>
+                </a:ln>
+                <a:solidFill>
+                  <a:schemeClr val="tx1"/>
+                </a:solidFill>
+                <a:effectLst/>
+                <a:uLnTx/>
+                <a:uFillTx/>
+                <a:latin typeface="+mn-lt"/>
+              </a:rPr>
+              <a:t>@</a:t>
+            </a:r>
+            <a:r>
+              <a:rPr kumimoji="0" lang="en-GB" sz="2000" b="0" i="1" strike="noStrike" kern="0" cap="none" spc="0" normalizeH="0" baseline="0" noProof="0" dirty="0" err="1" smtClean="0">
+                <a:ln>
+                  <a:noFill/>
+                </a:ln>
+                <a:solidFill>
+                  <a:schemeClr val="tx1"/>
+                </a:solidFill>
+                <a:effectLst/>
+                <a:uLnTx/>
+                <a:uFillTx/>
+                <a:latin typeface="+mn-lt"/>
+              </a:rPr>
+              <a:t>marcvanderkamp</a:t>
+            </a:r>
+            <a:endParaRPr kumimoji="0" lang="en-GB" sz="2000" b="0" i="1" strike="noStrike" kern="0" cap="none" spc="0" normalizeH="0" baseline="0" noProof="0" dirty="0" smtClean="0">
               <a:ln>
                 <a:noFill/>
               </a:ln>
@@ -4499,8 +4533,93 @@
               <a:latin typeface="+mn-lt"/>
             </a:endParaRPr>
           </a:p>
+          <a:p>
+            <a:pPr lvl="0" algn="ctr">
+              <a:spcBef>
+                <a:spcPct val="20000"/>
+              </a:spcBef>
+              <a:buClr>
+                <a:srgbClr val="2858BB"/>
+              </a:buClr>
+              <a:defRPr/>
+            </a:pPr>
+            <a:r>
+              <a:rPr lang="en-GB" sz="2000" i="1" kern="0" dirty="0">
+                <a:solidFill>
+                  <a:srgbClr val="0070C0"/>
+                </a:solidFill>
+                <a:latin typeface="+mn-lt"/>
+              </a:rPr>
+              <a:t>vanderkampgroup.wordpress.com</a:t>
+            </a:r>
+            <a:endParaRPr kumimoji="0" lang="en-GB" sz="2000" b="0" i="1" strike="noStrike" kern="0" cap="none" spc="0" normalizeH="0" baseline="0" noProof="0" dirty="0" smtClean="0">
+              <a:ln>
+                <a:noFill/>
+              </a:ln>
+              <a:solidFill>
+                <a:srgbClr val="0070C0"/>
+              </a:solidFill>
+              <a:effectLst/>
+              <a:uLnTx/>
+              <a:uFillTx/>
+              <a:latin typeface="+mn-lt"/>
+            </a:endParaRPr>
+          </a:p>
+          <a:p>
+            <a:pPr lvl="0" algn="ctr">
+              <a:spcBef>
+                <a:spcPct val="20000"/>
+              </a:spcBef>
+              <a:buClr>
+                <a:srgbClr val="2858BB"/>
+              </a:buClr>
+              <a:defRPr/>
+            </a:pPr>
+            <a:endParaRPr kumimoji="0" lang="en-GB" sz="2000" b="0" i="1" strike="noStrike" kern="0" cap="none" spc="0" normalizeH="0" baseline="0" noProof="0" dirty="0" smtClean="0">
+              <a:ln>
+                <a:noFill/>
+              </a:ln>
+              <a:solidFill>
+                <a:schemeClr val="tx1"/>
+              </a:solidFill>
+              <a:effectLst/>
+              <a:uLnTx/>
+              <a:uFillTx/>
+              <a:latin typeface="+mn-lt"/>
+            </a:endParaRPr>
+          </a:p>
         </p:txBody>
       </p:sp>
+      <p:pic>
+        <p:nvPicPr>
+          <p:cNvPr id="7" name="Picture 6"/>
+          <p:cNvPicPr>
+            <a:picLocks noChangeAspect="1"/>
+          </p:cNvPicPr>
+          <p:nvPr/>
+        </p:nvPicPr>
+        <p:blipFill>
+          <a:blip r:embed="rId3" cstate="print">
+            <a:extLst>
+              <a:ext uri="{28A0092B-C50C-407E-A947-70E740481C1C}">
+                <a14:useLocalDpi xmlns:a14="http://schemas.microsoft.com/office/drawing/2010/main" val="0"/>
+              </a:ext>
+            </a:extLst>
+          </a:blip>
+          <a:stretch>
+            <a:fillRect/>
+          </a:stretch>
+        </p:blipFill>
+        <p:spPr>
+          <a:xfrm>
+            <a:off x="2867697" y="3912974"/>
+            <a:ext cx="404091" cy="398148"/>
+          </a:xfrm>
+          <a:prstGeom prst="rect">
+            <a:avLst/>
+          </a:prstGeom>
+        </p:spPr>
+      </p:pic>
     </p:spTree>
   </p:cSld>
   <p:clrMapOvr>
@@ -4919,7 +5038,7 @@
               <a:rPr lang="en-GB" sz="2200" kern="0" dirty="0" smtClean="0">
                 <a:latin typeface="+mj-lt"/>
               </a:rPr>
-              <a:t>Instructions: </a:t>
+              <a:t>Files needed: </a:t>
             </a:r>
             <a:r>
               <a:rPr lang="en-GB" sz="1900" kern="0" dirty="0">
@@ -4948,9 +5067,6 @@
               </a:rPr>
               <a:t>To force the reaction, we will use a ‘reaction coordinate’: difference in distances of the bond formed and the bond broken</a:t>
             </a:r>
-            <a:endParaRPr lang="en-GB" sz="2200" kern="0" dirty="0" smtClean="0">
-              <a:latin typeface="+mj-lt"/>
-            </a:endParaRPr>
           </a:p>
         </p:txBody>
       </p:sp>
@@ -5285,7 +5401,19 @@
               <a:rPr lang="en-GB" sz="2200" kern="0" dirty="0" smtClean="0">
                 <a:latin typeface="+mj-lt"/>
               </a:rPr>
-              <a:t>First, we go from TS (R=-0.3) to the reactant </a:t>
+              <a:t>First, we go from TS (R</a:t>
+            </a:r>
+            <a:r>
+              <a:rPr lang="en-GB" sz="2200" kern="0" dirty="0" smtClean="0">
+                <a:latin typeface="+mj-lt"/>
+              </a:rPr>
+              <a:t>=−0.3</a:t>
+            </a:r>
+            <a:r>
+              <a:rPr lang="en-GB" sz="2200" kern="0" dirty="0" smtClean="0">
+                <a:latin typeface="+mj-lt"/>
+              </a:rPr>
+              <a:t>) to the reactant </a:t>
             </a:r>
             <a:r>
               <a:rPr lang="en-GB" sz="2200" kern="0" dirty="0" err="1" smtClean="0">
@@ -5297,7 +5425,29 @@
               <a:rPr lang="en-GB" sz="2200" kern="0" dirty="0" smtClean="0">
                 <a:latin typeface="+mj-lt"/>
               </a:rPr>
-              <a:t> (R=-1.8)</a:t>
+              <a:t> (R</a:t>
+            </a:r>
+            <a:r>
+              <a:rPr lang="en-GB" sz="2200" kern="0" dirty="0" smtClean="0">
+                <a:latin typeface="+mj-lt"/>
+              </a:rPr>
+              <a:t>=</a:t>
+            </a:r>
+            <a:r>
+              <a:rPr lang="en-GB" sz="2200" kern="0" dirty="0"/>
+              <a:t>−</a:t>
+            </a:r>
+            <a:r>
+              <a:rPr lang="en-GB" sz="2200" kern="0" dirty="0" smtClean="0">
+                <a:latin typeface="+mj-lt"/>
+              </a:rPr>
+              <a:t>1.8</a:t>
+            </a:r>
+            <a:r>
+              <a:rPr lang="en-GB" sz="2200" kern="0" dirty="0" smtClean="0">
+                <a:latin typeface="+mj-lt"/>
+              </a:rPr>
+              <a:t>)</a:t>
             </a:r>
             <a:endParaRPr lang="en-GB" sz="2200" kern="0" dirty="0" smtClean="0">
               <a:solidFill>
@@ -5854,14 +6004,17 @@
               </a:lnSpc>
             </a:pPr>
             <a:r>
-              <a:rPr lang="en-GB" sz="2200" kern="0" dirty="0" smtClean="0">
+              <a:rPr lang="en-GB" sz="2200" i="1" kern="0" dirty="0" smtClean="0">
                 <a:latin typeface="+mj-lt"/>
               </a:rPr>
-              <a:t>Scroll down and click the link indicated</a:t>
-            </a:r>
-            <a:endParaRPr lang="en-GB" sz="2200" kern="0" dirty="0" smtClean="0">
-              <a:latin typeface="+mj-lt"/>
-            </a:endParaRPr>
+              <a:t>Scroll down and click the link </a:t>
+            </a:r>
+            <a:r>
+              <a:rPr lang="en-GB" sz="2200" i="1" kern="0" dirty="0" smtClean="0">
+                <a:latin typeface="+mj-lt"/>
+              </a:rPr>
+              <a:t>indicated</a:t>
+            </a:r>
           </a:p>
           <a:p>
             <a:pPr>
@@ -5869,12 +6022,9 @@
                 <a:spcPct val="90000"/>
               </a:lnSpc>
             </a:pPr>
-            <a:r>
-              <a:rPr lang="en-GB" sz="2200" kern="0" dirty="0" smtClean="0">
-                <a:latin typeface="+mj-lt"/>
-              </a:rPr>
-              <a:t>Go directly to Part 1, procedure</a:t>
-            </a:r>
+            <a:endParaRPr lang="en-GB" sz="2200" kern="0" dirty="0" smtClean="0">
+              <a:latin typeface="+mj-lt"/>
+            </a:endParaRPr>
           </a:p>
           <a:p>
             <a:pPr>
@@ -5883,22 +6033,11 @@
               </a:lnSpc>
             </a:pPr>
             <a:r>
-              <a:rPr lang="en-GB" sz="2200" kern="0" dirty="0"/>
-              <a:t>Download of zip file (qmmm.zip</a:t>
-            </a:r>
-            <a:r>
-              <a:rPr lang="en-GB" sz="2200" kern="0" dirty="0" smtClean="0"/>
-              <a:t>) to:   </a:t>
-            </a:r>
-            <a:r>
-              <a:rPr lang="en-GB" sz="2200" b="1" kern="0" dirty="0" err="1" smtClean="0"/>
-              <a:t>MyFiles</a:t>
-            </a:r>
-            <a:r>
-              <a:rPr lang="en-GB" sz="2200" b="1" kern="0" dirty="0" smtClean="0"/>
-              <a:t> (O:)</a:t>
-            </a:r>
-            <a:endParaRPr lang="en-GB" sz="2200" b="1" kern="0" dirty="0"/>
+              <a:rPr lang="en-GB" sz="2200" kern="0" dirty="0" smtClean="0">
+                <a:latin typeface="+mj-lt"/>
+              </a:rPr>
+              <a:t>Go directly to Part 1, procedure</a:t>
+            </a:r>
           </a:p>
           <a:p>
             <a:pPr>
@@ -5907,6 +6046,30 @@
               </a:lnSpc>
             </a:pPr>
             <a:r>
+              <a:rPr lang="en-GB" sz="2200" kern="0" dirty="0"/>
+              <a:t>Download of zip file (qmmm.zip</a:t>
+            </a:r>
+            <a:r>
+              <a:rPr lang="en-GB" sz="2200" kern="0" dirty="0" smtClean="0"/>
+              <a:t>) to:   </a:t>
+            </a:r>
+            <a:r>
+              <a:rPr lang="en-GB" sz="2200" b="1" kern="0" dirty="0" err="1" smtClean="0"/>
+              <a:t>MyFiles</a:t>
+            </a:r>
+            <a:r>
+              <a:rPr lang="en-GB" sz="2200" b="1" kern="0" dirty="0" smtClean="0"/>
+              <a:t> (O:)</a:t>
+            </a:r>
+            <a:endParaRPr lang="en-GB" sz="2200" b="1" kern="0" dirty="0"/>
+          </a:p>
+          <a:p>
+            <a:pPr>
+              <a:lnSpc>
+                <a:spcPct val="90000"/>
+              </a:lnSpc>
+            </a:pPr>
+            <a:r>
               <a:rPr lang="en-GB" sz="2200" kern="0" dirty="0" smtClean="0">
                 <a:latin typeface="+mj-lt"/>
               </a:rPr>
@@ -5946,8 +6109,67 @@
               <a:rPr lang="en-GB" sz="2200" kern="0" dirty="0" smtClean="0">
                 <a:latin typeface="+mj-lt"/>
               </a:rPr>
-              <a:t> visualising the structure in VMD</a:t>
-            </a:r>
+              <a:t> visualising the structure in </a:t>
+            </a:r>
+            <a:r>
+              <a:rPr lang="en-GB" sz="2200" kern="0" dirty="0" smtClean="0">
+                <a:latin typeface="+mj-lt"/>
+              </a:rPr>
+              <a:t>VMD</a:t>
+            </a:r>
+          </a:p>
+          <a:p>
+            <a:pPr>
+              <a:lnSpc>
+                <a:spcPct val="90000"/>
+              </a:lnSpc>
+            </a:pPr>
+            <a:endParaRPr lang="en-GB" sz="2200" kern="0" dirty="0">
+              <a:latin typeface="+mj-lt"/>
+            </a:endParaRPr>
+          </a:p>
+          <a:p>
+            <a:pPr>
+              <a:lnSpc>
+                <a:spcPct val="90000"/>
+              </a:lnSpc>
+            </a:pPr>
+            <a:r>
+              <a:rPr lang="en-GB" sz="2200" kern="0" dirty="0"/>
+              <a:t>In case the short-cut to MSYS doesn’t work, start it through </a:t>
+            </a:r>
+            <a:r>
+              <a:rPr lang="en-GB" sz="2200" i="1" kern="0" dirty="0"/>
+              <a:t>Run… </a:t>
+            </a:r>
+            <a:endParaRPr lang="en-GB" sz="2200" kern="0" dirty="0"/>
+          </a:p>
+          <a:p>
+            <a:pPr marL="0" indent="0">
+              <a:lnSpc>
+                <a:spcPct val="90000"/>
+              </a:lnSpc>
+              <a:buNone/>
+            </a:pPr>
+            <a:r>
+              <a:rPr lang="en-GB" sz="2200" i="1" kern="0" dirty="0"/>
+              <a:t>	C:/msys/1.0/msys.bat</a:t>
+            </a:r>
+            <a:r>
+              <a:rPr lang="en-GB" sz="2200" kern="0" dirty="0"/>
+              <a:t>   (and click ‘OK’)</a:t>
+            </a:r>
+          </a:p>
+          <a:p>
+            <a:pPr marL="0" indent="0">
+              <a:lnSpc>
+                <a:spcPct val="90000"/>
+              </a:lnSpc>
+              <a:buNone/>
+            </a:pPr>
+            <a:endParaRPr lang="en-GB" sz="2200" kern="0" dirty="0" smtClean="0">
+              <a:latin typeface="+mj-lt"/>
+            </a:endParaRPr>
           </a:p>
           <a:p>
             <a:pPr marL="57150" indent="0">
@@ -5978,6 +6200,598 @@
         <p:cTn id="1" dur="indefinite" restart="never" nodeType="tmRoot"/>
       </p:par>
     </p:tnLst>
+  </p:timing>
+</p:sld>
+</file>
+
+<file path=ppt/slides/slide12.xml><?xml version="1.0" encoding="utf-8"?>
+<p:sld xmlns:a="http://schemas.openxmlformats.org/drawingml/2006/main" xmlns:r="http://schemas.openxmlformats.org/officeDocument/2006/relationships" xmlns:p="http://schemas.openxmlformats.org/presentationml/2006/main">
+  <p:cSld>
+    <p:spTree>
+      <p:nvGrpSpPr>
+        <p:cNvPr id="1" name=""/>
+        <p:cNvGrpSpPr/>
+        <p:nvPr/>
+      </p:nvGrpSpPr>
+      <p:grpSpPr>
+        <a:xfrm>
+          <a:off x="0" y="0"/>
+          <a:ext cx="0" cy="0"/>
+          <a:chOff x="0" y="0"/>
+          <a:chExt cx="0" cy="0"/>
+        </a:xfrm>
+      </p:grpSpPr>
+      <p:sp>
+        <p:nvSpPr>
+          <p:cNvPr id="2" name="Rectangle 2"/>
+          <p:cNvSpPr txBox="1">
+            <a:spLocks noChangeArrowheads="1"/>
+          </p:cNvSpPr>
+          <p:nvPr/>
+        </p:nvSpPr>
+        <p:spPr>
+          <a:xfrm>
+            <a:off x="611188" y="260350"/>
+            <a:ext cx="7772400" cy="533400"/>
+          </a:xfrm>
+          <a:prstGeom prst="rect">
+            <a:avLst/>
+          </a:prstGeom>
+        </p:spPr>
+        <p:txBody>
+          <a:bodyPr/>
+          <a:lstStyle>
+            <a:lvl1pPr marL="441325" indent="-441325" algn="l" rtl="0" fontAlgn="base">
+              <a:spcBef>
+                <a:spcPct val="0"/>
+              </a:spcBef>
+              <a:spcAft>
+                <a:spcPct val="0"/>
+              </a:spcAft>
+              <a:buBlip>
+                <a:blip r:embed="rId2"/>
+              </a:buBlip>
+              <a:defRPr sz="3200">
+                <a:solidFill>
+                  <a:srgbClr val="B01C2E"/>
+                </a:solidFill>
+                <a:latin typeface="+mj-lt"/>
+                <a:ea typeface="+mj-ea"/>
+                <a:cs typeface="+mj-cs"/>
+              </a:defRPr>
+            </a:lvl1pPr>
+            <a:lvl2pPr marL="441325" indent="-441325" algn="l" rtl="0" fontAlgn="base">
+              <a:spcBef>
+                <a:spcPct val="0"/>
+              </a:spcBef>
+              <a:spcAft>
+                <a:spcPct val="0"/>
+              </a:spcAft>
+              <a:buBlip>
+                <a:blip r:embed="rId2"/>
+              </a:buBlip>
+              <a:defRPr sz="4400">
+                <a:solidFill>
+                  <a:srgbClr val="B01C2E"/>
+                </a:solidFill>
+                <a:latin typeface="Arial" charset="0"/>
+              </a:defRPr>
+            </a:lvl2pPr>
+            <a:lvl3pPr marL="441325" indent="-441325" algn="l" rtl="0" fontAlgn="base">
+              <a:spcBef>
+                <a:spcPct val="0"/>
+              </a:spcBef>
+              <a:spcAft>
+                <a:spcPct val="0"/>
+              </a:spcAft>
+              <a:buBlip>
+                <a:blip r:embed="rId2"/>
+              </a:buBlip>
+              <a:defRPr sz="4400">
+                <a:solidFill>
+                  <a:srgbClr val="B01C2E"/>
+                </a:solidFill>
+                <a:latin typeface="Arial" charset="0"/>
+              </a:defRPr>
+            </a:lvl3pPr>
+            <a:lvl4pPr marL="441325" indent="-441325" algn="l" rtl="0" fontAlgn="base">
+              <a:spcBef>
+                <a:spcPct val="0"/>
+              </a:spcBef>
+              <a:spcAft>
+                <a:spcPct val="0"/>
+              </a:spcAft>
+              <a:buBlip>
+                <a:blip r:embed="rId2"/>
+              </a:buBlip>
+              <a:defRPr sz="4400">
+                <a:solidFill>
+                  <a:srgbClr val="B01C2E"/>
+                </a:solidFill>
+                <a:latin typeface="Arial" charset="0"/>
+              </a:defRPr>
+            </a:lvl4pPr>
+            <a:lvl5pPr marL="441325" indent="-441325" algn="l" rtl="0" fontAlgn="base">
+              <a:spcBef>
+                <a:spcPct val="0"/>
+              </a:spcBef>
+              <a:spcAft>
+                <a:spcPct val="0"/>
+              </a:spcAft>
+              <a:buBlip>
+                <a:blip r:embed="rId2"/>
+              </a:buBlip>
+              <a:defRPr sz="4400">
+                <a:solidFill>
+                  <a:srgbClr val="B01C2E"/>
+                </a:solidFill>
+                <a:latin typeface="Arial" charset="0"/>
+              </a:defRPr>
+            </a:lvl5pPr>
+            <a:lvl6pPr marL="898525" indent="-441325" algn="l" rtl="0" fontAlgn="base">
+              <a:spcBef>
+                <a:spcPct val="0"/>
+              </a:spcBef>
+              <a:spcAft>
+                <a:spcPct val="0"/>
+              </a:spcAft>
+              <a:buBlip>
+                <a:blip r:embed="rId2"/>
+              </a:buBlip>
+              <a:defRPr sz="4400">
+                <a:solidFill>
+                  <a:srgbClr val="B01C2E"/>
+                </a:solidFill>
+                <a:latin typeface="Arial" charset="0"/>
+              </a:defRPr>
+            </a:lvl6pPr>
+            <a:lvl7pPr marL="1355725" indent="-441325" algn="l" rtl="0" fontAlgn="base">
+              <a:spcBef>
+                <a:spcPct val="0"/>
+              </a:spcBef>
+              <a:spcAft>
+                <a:spcPct val="0"/>
+              </a:spcAft>
+              <a:buBlip>
+                <a:blip r:embed="rId2"/>
+              </a:buBlip>
+              <a:defRPr sz="4400">
+                <a:solidFill>
+                  <a:srgbClr val="B01C2E"/>
+                </a:solidFill>
+                <a:latin typeface="Arial" charset="0"/>
+              </a:defRPr>
+            </a:lvl7pPr>
+            <a:lvl8pPr marL="1812925" indent="-441325" algn="l" rtl="0" fontAlgn="base">
+              <a:spcBef>
+                <a:spcPct val="0"/>
+              </a:spcBef>
+              <a:spcAft>
+                <a:spcPct val="0"/>
+              </a:spcAft>
+              <a:buBlip>
+                <a:blip r:embed="rId2"/>
+              </a:buBlip>
+              <a:defRPr sz="4400">
+                <a:solidFill>
+                  <a:srgbClr val="B01C2E"/>
+                </a:solidFill>
+                <a:latin typeface="Arial" charset="0"/>
+              </a:defRPr>
+            </a:lvl8pPr>
+            <a:lvl9pPr marL="2270125" indent="-441325" algn="l" rtl="0" fontAlgn="base">
+              <a:spcBef>
+                <a:spcPct val="0"/>
+              </a:spcBef>
+              <a:spcAft>
+                <a:spcPct val="0"/>
+              </a:spcAft>
+              <a:buBlip>
+                <a:blip r:embed="rId2"/>
+              </a:buBlip>
+              <a:defRPr sz="4400">
+                <a:solidFill>
+                  <a:srgbClr val="B01C2E"/>
+                </a:solidFill>
+                <a:latin typeface="Arial" charset="0"/>
+              </a:defRPr>
+            </a:lvl9pPr>
+          </a:lstStyle>
+          <a:p>
+            <a:r>
+              <a:rPr lang="en-GB" kern="0" dirty="0" smtClean="0">
+                <a:solidFill>
+                  <a:srgbClr val="C00000"/>
+                </a:solidFill>
+              </a:rPr>
+              <a:t>Transition state stabilisation – AM1</a:t>
+            </a:r>
+            <a:endParaRPr lang="en-GB" kern="0" dirty="0">
+              <a:solidFill>
+                <a:srgbClr val="C00000"/>
+              </a:solidFill>
+            </a:endParaRPr>
+          </a:p>
+        </p:txBody>
+      </p:sp>
+      <p:pic>
+        <p:nvPicPr>
+          <p:cNvPr id="11" name="Picture 10"/>
+          <p:cNvPicPr>
+            <a:picLocks noChangeAspect="1"/>
+          </p:cNvPicPr>
+          <p:nvPr/>
+        </p:nvPicPr>
+        <p:blipFill>
+          <a:blip r:embed="rId3"/>
+          <a:stretch>
+            <a:fillRect/>
+          </a:stretch>
+        </p:blipFill>
+        <p:spPr>
+          <a:xfrm>
+            <a:off x="934949" y="787440"/>
+            <a:ext cx="6460761" cy="4163793"/>
+          </a:xfrm>
+          <a:prstGeom prst="rect">
+            <a:avLst/>
+          </a:prstGeom>
+        </p:spPr>
+      </p:pic>
+      <p:sp>
+        <p:nvSpPr>
+          <p:cNvPr id="12" name="TextBox 11"/>
+          <p:cNvSpPr txBox="1"/>
+          <p:nvPr/>
+        </p:nvSpPr>
+        <p:spPr>
+          <a:xfrm>
+            <a:off x="5861995" y="1135212"/>
+            <a:ext cx="1424066" cy="461665"/>
+          </a:xfrm>
+          <a:prstGeom prst="rect">
+            <a:avLst/>
+          </a:prstGeom>
+          <a:noFill/>
+        </p:spPr>
+        <p:txBody>
+          <a:bodyPr wrap="square" rtlCol="0">
+            <a:spAutoFit/>
+          </a:bodyPr>
+          <a:lstStyle/>
+          <a:p>
+            <a:r>
+              <a:rPr lang="en-GB" sz="2400" i="1" dirty="0" smtClean="0"/>
+              <a:t>R</a:t>
+            </a:r>
+            <a:r>
+              <a:rPr lang="en-GB" sz="2400" baseline="30000" dirty="0" smtClean="0"/>
+              <a:t>2</a:t>
+            </a:r>
+            <a:r>
+              <a:rPr lang="en-GB" sz="2400" dirty="0" smtClean="0"/>
+              <a:t> ≈ 0.8</a:t>
+            </a:r>
+            <a:endParaRPr lang="en-GB" sz="2400" dirty="0"/>
+          </a:p>
+        </p:txBody>
+      </p:sp>
+      <p:sp>
+        <p:nvSpPr>
+          <p:cNvPr id="5" name="Rectangle 4"/>
+          <p:cNvSpPr/>
+          <p:nvPr/>
+        </p:nvSpPr>
+        <p:spPr>
+          <a:xfrm>
+            <a:off x="317908" y="4825959"/>
+            <a:ext cx="8517868" cy="1015663"/>
+          </a:xfrm>
+          <a:prstGeom prst="rect">
+            <a:avLst/>
+          </a:prstGeom>
+          <a:solidFill>
+            <a:schemeClr val="bg1">
+              <a:alpha val="91000"/>
+            </a:schemeClr>
+          </a:solidFill>
+          <a:ln>
+            <a:solidFill>
+              <a:schemeClr val="accent2"/>
+            </a:solidFill>
+          </a:ln>
+        </p:spPr>
+        <p:txBody>
+          <a:bodyPr wrap="square">
+            <a:spAutoFit/>
+          </a:bodyPr>
+          <a:lstStyle/>
+          <a:p>
+            <a:pPr algn="ctr"/>
+            <a:r>
+              <a:rPr lang="en-US" sz="2000" dirty="0" smtClean="0">
+                <a:solidFill>
+                  <a:srgbClr val="000000"/>
+                </a:solidFill>
+                <a:latin typeface="+mj-lt"/>
+              </a:rPr>
+              <a:t>“Correlation </a:t>
+            </a:r>
+            <a:r>
+              <a:rPr lang="en-US" sz="2000" dirty="0">
+                <a:solidFill>
+                  <a:srgbClr val="000000"/>
+                </a:solidFill>
+                <a:latin typeface="+mj-lt"/>
+              </a:rPr>
+              <a:t>of barrier height with TS stabilization shows that the efficiency of reaction in the enzyme is determined by the degree of TS stabilization in the </a:t>
+            </a:r>
+            <a:r>
+              <a:rPr lang="en-US" sz="2000" dirty="0" smtClean="0">
+                <a:solidFill>
+                  <a:srgbClr val="000000"/>
+                </a:solidFill>
+                <a:latin typeface="+mj-lt"/>
+              </a:rPr>
+              <a:t>enzyme”</a:t>
+            </a:r>
+            <a:r>
+              <a:rPr lang="en-US" sz="2000" baseline="30000" dirty="0" smtClean="0">
+                <a:solidFill>
+                  <a:srgbClr val="000000"/>
+                </a:solidFill>
+                <a:latin typeface="+mj-lt"/>
+              </a:rPr>
+              <a:t>1</a:t>
+            </a:r>
+            <a:endParaRPr lang="en-GB" sz="2000" baseline="30000" dirty="0">
+              <a:latin typeface="+mj-lt"/>
+            </a:endParaRPr>
+          </a:p>
+        </p:txBody>
+      </p:sp>
+      <p:sp>
+        <p:nvSpPr>
+          <p:cNvPr id="6" name="Rectangle 5"/>
+          <p:cNvSpPr/>
+          <p:nvPr/>
+        </p:nvSpPr>
+        <p:spPr>
+          <a:xfrm>
+            <a:off x="2868911" y="6085929"/>
+            <a:ext cx="6151799" cy="646331"/>
+          </a:xfrm>
+          <a:prstGeom prst="rect">
+            <a:avLst/>
+          </a:prstGeom>
+        </p:spPr>
+        <p:txBody>
+          <a:bodyPr wrap="square">
+            <a:spAutoFit/>
+          </a:bodyPr>
+          <a:lstStyle/>
+          <a:p>
+            <a:r>
+              <a:rPr lang="en-GB" baseline="30000" dirty="0" smtClean="0">
+                <a:solidFill>
+                  <a:schemeClr val="bg1"/>
+                </a:solidFill>
+                <a:latin typeface="ArialMT"/>
+              </a:rPr>
+              <a:t>1</a:t>
+            </a:r>
+            <a:r>
+              <a:rPr lang="en-GB" dirty="0" smtClean="0">
+                <a:solidFill>
+                  <a:schemeClr val="bg1"/>
+                </a:solidFill>
+                <a:latin typeface="ArialMT"/>
+              </a:rPr>
+              <a:t>F. </a:t>
+            </a:r>
+            <a:r>
+              <a:rPr lang="en-GB" dirty="0" err="1" smtClean="0">
+                <a:solidFill>
+                  <a:schemeClr val="bg1"/>
+                </a:solidFill>
+                <a:latin typeface="ArialMT"/>
+              </a:rPr>
+              <a:t>Claeyssens</a:t>
+            </a:r>
+            <a:r>
+              <a:rPr lang="en-GB" dirty="0">
+                <a:solidFill>
+                  <a:schemeClr val="bg1"/>
+                </a:solidFill>
+                <a:latin typeface="ArialMT"/>
+              </a:rPr>
+              <a:t>, </a:t>
+            </a:r>
+            <a:r>
+              <a:rPr lang="en-GB" dirty="0" smtClean="0">
+                <a:solidFill>
+                  <a:schemeClr val="bg1"/>
+                </a:solidFill>
+                <a:latin typeface="ArialMT"/>
+              </a:rPr>
+              <a:t>K.E. </a:t>
+            </a:r>
+            <a:r>
+              <a:rPr lang="en-GB" dirty="0" err="1">
+                <a:solidFill>
+                  <a:schemeClr val="bg1"/>
+                </a:solidFill>
+                <a:latin typeface="ArialMT"/>
+              </a:rPr>
+              <a:t>Ranaghan</a:t>
+            </a:r>
+            <a:r>
+              <a:rPr lang="en-GB" dirty="0">
+                <a:solidFill>
+                  <a:schemeClr val="bg1"/>
+                </a:solidFill>
+                <a:latin typeface="ArialMT"/>
+              </a:rPr>
+              <a:t>, F.R. </a:t>
+            </a:r>
+            <a:r>
+              <a:rPr lang="en-GB" dirty="0" err="1">
+                <a:solidFill>
+                  <a:schemeClr val="bg1"/>
+                </a:solidFill>
+                <a:latin typeface="ArialMT"/>
+              </a:rPr>
+              <a:t>Manby</a:t>
+            </a:r>
+            <a:r>
+              <a:rPr lang="en-GB" dirty="0">
+                <a:solidFill>
+                  <a:schemeClr val="bg1"/>
+                </a:solidFill>
+                <a:latin typeface="ArialMT"/>
+              </a:rPr>
+              <a:t>, J.N. Harvey &amp; A.J. Mulholland, </a:t>
+            </a:r>
+            <a:r>
+              <a:rPr lang="en-GB" b="1" i="1" dirty="0" smtClean="0">
+                <a:solidFill>
+                  <a:schemeClr val="bg1"/>
+                </a:solidFill>
+                <a:latin typeface="ArialMT"/>
+              </a:rPr>
+              <a:t>Chem</a:t>
+            </a:r>
+            <a:r>
+              <a:rPr lang="en-GB" b="1" i="1" dirty="0">
+                <a:solidFill>
+                  <a:schemeClr val="bg1"/>
+                </a:solidFill>
+                <a:latin typeface="ArialMT"/>
+              </a:rPr>
+              <a:t>. </a:t>
+            </a:r>
+            <a:r>
+              <a:rPr lang="en-GB" b="1" i="1" dirty="0" err="1">
+                <a:solidFill>
+                  <a:schemeClr val="bg1"/>
+                </a:solidFill>
+                <a:latin typeface="ArialMT"/>
+              </a:rPr>
+              <a:t>Commun</a:t>
+            </a:r>
+            <a:r>
+              <a:rPr lang="en-GB" b="1" i="1" dirty="0">
+                <a:solidFill>
+                  <a:schemeClr val="bg1"/>
+                </a:solidFill>
+                <a:latin typeface="ArialMT"/>
+              </a:rPr>
+              <a:t>.</a:t>
+            </a:r>
+            <a:r>
+              <a:rPr lang="en-GB" dirty="0">
+                <a:solidFill>
+                  <a:schemeClr val="bg1"/>
+                </a:solidFill>
+                <a:latin typeface="ArialMT"/>
+              </a:rPr>
+              <a:t> 5068-5070 (2005)</a:t>
+            </a:r>
+            <a:endParaRPr lang="en-GB" dirty="0">
+              <a:solidFill>
+                <a:schemeClr val="bg1"/>
+              </a:solidFill>
+            </a:endParaRPr>
+          </a:p>
+        </p:txBody>
+      </p:sp>
+    </p:spTree>
+    <p:extLst>
+      <p:ext uri="{BB962C8B-B14F-4D97-AF65-F5344CB8AC3E}">
+        <p14:creationId xmlns:p14="http://schemas.microsoft.com/office/powerpoint/2010/main" val="214050430"/>
+      </p:ext>
+    </p:extLst>
+  </p:cSld>
+  <p:clrMapOvr>
+    <a:masterClrMapping/>
+  </p:clrMapOvr>
+  <p:timing>
+    <p:tnLst>
+      <p:par>
+        <p:cTn id="1" dur="indefinite" restart="never" nodeType="tmRoot">
+          <p:childTnLst>
+            <p:seq concurrent="1" nextAc="seek">
+              <p:cTn id="2" dur="indefinite" nodeType="mainSeq">
+                <p:childTnLst>
+                  <p:par>
+                    <p:cTn id="3" fill="hold">
+                      <p:stCondLst>
+                        <p:cond delay="indefinite"/>
+                      </p:stCondLst>
+                      <p:childTnLst>
+                        <p:par>
+                          <p:cTn id="4" fill="hold">
+                            <p:stCondLst>
+                              <p:cond delay="0"/>
+                            </p:stCondLst>
+                            <p:childTnLst>
+                              <p:par>
+                                <p:cTn id="5" presetID="1" presetClass="entr" presetSubtype="0" fill="hold" grpId="0" nodeType="clickEffect">
+                                  <p:stCondLst>
+                                    <p:cond delay="0"/>
+                                  </p:stCondLst>
+                                  <p:childTnLst>
+                                    <p:set>
+                                      <p:cBhvr>
+                                        <p:cTn id="6" dur="1" fill="hold">
+                                          <p:stCondLst>
+                                            <p:cond delay="0"/>
+                                          </p:stCondLst>
+                                        </p:cTn>
+                                        <p:tgtEl>
+                                          <p:spTgt spid="5"/>
+                                        </p:tgtEl>
+                                        <p:attrNameLst>
+                                          <p:attrName>style.visibility</p:attrName>
+                                        </p:attrNameLst>
+                                      </p:cBhvr>
+                                      <p:to>
+                                        <p:strVal val="visible"/>
+                                      </p:to>
+                                    </p:set>
+                                  </p:childTnLst>
+                                </p:cTn>
+                              </p:par>
+                            </p:childTnLst>
+                          </p:cTn>
+                        </p:par>
+                      </p:childTnLst>
+                    </p:cTn>
+                  </p:par>
+                </p:childTnLst>
+              </p:cTn>
+              <p:prevCondLst>
+                <p:cond evt="onPrev" delay="0">
+                  <p:tgtEl>
+                    <p:sldTgt/>
+                  </p:tgtEl>
+                </p:cond>
+              </p:prevCondLst>
+              <p:nextCondLst>
+                <p:cond evt="onNext" delay="0">
+                  <p:tgtEl>
+                    <p:sldTgt/>
+                  </p:tgtEl>
+                </p:cond>
+              </p:nextCondLst>
+            </p:seq>
+          </p:childTnLst>
+        </p:cTn>
+      </p:par>
+    </p:tnLst>
+    <p:bldLst>
+      <p:bldP spid="5" grpId="0" animBg="1"/>
+    </p:bldLst>
   </p:timing>
 </p:sld>
 </file>
@@ -6603,7 +7417,7 @@
           <a:graphicData uri="http://schemas.openxmlformats.org/presentationml/2006/ole">
             <mc:AlternateContent xmlns:mc="http://schemas.openxmlformats.org/markup-compatibility/2006">
               <mc:Choice xmlns:v="urn:schemas-microsoft-com:vml" Requires="v">
-                <p:oleObj spid="_x0000_s4115" name="Picture" r:id="rId4" imgW="7561080" imgH="3616200" progId="Word.Picture.8">
+                <p:oleObj spid="_x0000_s4121" name="Picture" r:id="rId4" imgW="7561080" imgH="3616200" progId="Word.Picture.8">
                   <p:embed/>
                 </p:oleObj>
               </mc:Choice>
@@ -6740,7 +7554,7 @@
           <a:noFill/>
           <a:extLst>
             <a:ext uri="{909E8E84-426E-40dd-AFC4-6F175D3DCCD1}">
-              <a14:hiddenFill xmlns="" xmlns:a14="http://schemas.microsoft.com/office/drawing/2010/main">
+              <a14:hiddenFill xmlns:a14="http://schemas.microsoft.com/office/drawing/2010/main" xmlns="">
                 <a:solidFill>
                   <a:srgbClr val="FFFFFF"/>
                 </a:solidFill>
@@ -8007,7 +8821,7 @@
           <a:noFill/>
           <a:extLst>
             <a:ext uri="{909E8E84-426E-40dd-AFC4-6F175D3DCCD1}">
-              <a14:hiddenFill xmlns="" xmlns:a14="http://schemas.microsoft.com/office/drawing/2010/main">
+              <a14:hiddenFill xmlns:a14="http://schemas.microsoft.com/office/drawing/2010/main" xmlns="">
                 <a:solidFill>
                   <a:srgbClr val="FFFFFF"/>
                 </a:solidFill>

</xml_diff>